<commit_message>
added slides and transcriptions
</commit_message>
<xml_diff>
--- a/Slides/Day-2/FASTAPI Development using Python on Cloud-Day2.pptx
+++ b/Slides/Day-2/FASTAPI Development using Python on Cloud-Day2.pptx
@@ -3496,7 +3496,7 @@
           <a:p>
             <a:fld id="{FD1C4689-B28D-4D3C-8B05-9ABB967E2A3E}" type="datetime1">
               <a:rPr lang="en-US" smtClean="0"/>
-              <a:t>2/9/2026</a:t>
+              <a:t>2/10/2026</a:t>
             </a:fld>
             <a:endParaRPr lang="en-US" dirty="0"/>
           </a:p>
@@ -3753,7 +3753,7 @@
           <a:p>
             <a:fld id="{FD1C4689-B28D-4D3C-8B05-9ABB967E2A3E}" type="datetime1">
               <a:rPr lang="en-US" smtClean="0"/>
-              <a:t>2/9/2026</a:t>
+              <a:t>2/10/2026</a:t>
             </a:fld>
             <a:endParaRPr lang="en-US" dirty="0"/>
           </a:p>
@@ -4073,7 +4073,7 @@
           <a:p>
             <a:fld id="{FD1C4689-B28D-4D3C-8B05-9ABB967E2A3E}" type="datetime1">
               <a:rPr lang="en-US" smtClean="0"/>
-              <a:t>2/9/2026</a:t>
+              <a:t>2/10/2026</a:t>
             </a:fld>
             <a:endParaRPr lang="en-US" dirty="0"/>
           </a:p>
@@ -4412,7 +4412,7 @@
           <a:p>
             <a:fld id="{FD1C4689-B28D-4D3C-8B05-9ABB967E2A3E}" type="datetime1">
               <a:rPr lang="en-US" smtClean="0"/>
-              <a:t>2/9/2026</a:t>
+              <a:t>2/10/2026</a:t>
             </a:fld>
             <a:endParaRPr lang="en-US" dirty="0"/>
           </a:p>
@@ -4732,7 +4732,7 @@
           <a:p>
             <a:fld id="{FD1C4689-B28D-4D3C-8B05-9ABB967E2A3E}" type="datetime1">
               <a:rPr lang="en-US" smtClean="0"/>
-              <a:t>2/9/2026</a:t>
+              <a:t>2/10/2026</a:t>
             </a:fld>
             <a:endParaRPr lang="en-US" dirty="0"/>
           </a:p>
@@ -5131,7 +5131,7 @@
           <a:p>
             <a:fld id="{FD1C4689-B28D-4D3C-8B05-9ABB967E2A3E}" type="datetime1">
               <a:rPr lang="en-US" smtClean="0"/>
-              <a:t>2/9/2026</a:t>
+              <a:t>2/10/2026</a:t>
             </a:fld>
             <a:endParaRPr lang="en-US" dirty="0"/>
           </a:p>
@@ -5307,7 +5307,7 @@
           <a:p>
             <a:fld id="{FD1C4689-B28D-4D3C-8B05-9ABB967E2A3E}" type="datetime1">
               <a:rPr lang="en-US" smtClean="0"/>
-              <a:t>2/9/2026</a:t>
+              <a:t>2/10/2026</a:t>
             </a:fld>
             <a:endParaRPr lang="en-US" dirty="0"/>
           </a:p>
@@ -5493,7 +5493,7 @@
           <a:p>
             <a:fld id="{FD1C4689-B28D-4D3C-8B05-9ABB967E2A3E}" type="datetime1">
               <a:rPr lang="en-US" smtClean="0"/>
-              <a:t>2/9/2026</a:t>
+              <a:t>2/10/2026</a:t>
             </a:fld>
             <a:endParaRPr lang="en-US" dirty="0"/>
           </a:p>
@@ -5669,7 +5669,7 @@
           <a:p>
             <a:fld id="{FD1C4689-B28D-4D3C-8B05-9ABB967E2A3E}" type="datetime1">
               <a:rPr lang="en-US" smtClean="0"/>
-              <a:t>2/9/2026</a:t>
+              <a:t>2/10/2026</a:t>
             </a:fld>
             <a:endParaRPr lang="en-US" dirty="0"/>
           </a:p>
@@ -5922,7 +5922,7 @@
           <a:p>
             <a:fld id="{FD1C4689-B28D-4D3C-8B05-9ABB967E2A3E}" type="datetime1">
               <a:rPr lang="en-US" smtClean="0"/>
-              <a:t>2/9/2026</a:t>
+              <a:t>2/10/2026</a:t>
             </a:fld>
             <a:endParaRPr lang="en-US" dirty="0"/>
           </a:p>
@@ -6160,7 +6160,7 @@
           <a:p>
             <a:fld id="{FD1C4689-B28D-4D3C-8B05-9ABB967E2A3E}" type="datetime1">
               <a:rPr lang="en-US" smtClean="0"/>
-              <a:t>2/9/2026</a:t>
+              <a:t>2/10/2026</a:t>
             </a:fld>
             <a:endParaRPr lang="en-US" dirty="0"/>
           </a:p>
@@ -6540,7 +6540,7 @@
           <a:p>
             <a:fld id="{FD1C4689-B28D-4D3C-8B05-9ABB967E2A3E}" type="datetime1">
               <a:rPr lang="en-US" smtClean="0"/>
-              <a:t>2/9/2026</a:t>
+              <a:t>2/10/2026</a:t>
             </a:fld>
             <a:endParaRPr lang="en-US" dirty="0"/>
           </a:p>
@@ -6669,7 +6669,7 @@
           <a:p>
             <a:fld id="{7C72CE4D-D83F-44D4-ACB0-A88A6B9DB4F7}" type="datetime1">
               <a:rPr lang="en-US" smtClean="0"/>
-              <a:t>2/9/2026</a:t>
+              <a:t>2/10/2026</a:t>
             </a:fld>
             <a:endParaRPr lang="en-US"/>
           </a:p>
@@ -6767,7 +6767,7 @@
           <a:p>
             <a:fld id="{9A62F981-1EE1-49F5-B605-4EA23F0307AC}" type="datetime1">
               <a:rPr lang="en-US" smtClean="0"/>
-              <a:t>2/9/2026</a:t>
+              <a:t>2/10/2026</a:t>
             </a:fld>
             <a:endParaRPr lang="en-US"/>
           </a:p>
@@ -7025,7 +7025,7 @@
           <a:p>
             <a:fld id="{B0B6493B-A447-4205-AC2D-AE2DEDAE4E3B}" type="datetime1">
               <a:rPr lang="en-US" smtClean="0"/>
-              <a:t>2/9/2026</a:t>
+              <a:t>2/10/2026</a:t>
             </a:fld>
             <a:endParaRPr lang="en-US"/>
           </a:p>
@@ -7338,7 +7338,7 @@
           <a:p>
             <a:fld id="{FD1C4689-B28D-4D3C-8B05-9ABB967E2A3E}" type="datetime1">
               <a:rPr lang="en-US" smtClean="0"/>
-              <a:t>2/9/2026</a:t>
+              <a:t>2/10/2026</a:t>
             </a:fld>
             <a:endParaRPr lang="en-US" dirty="0"/>
           </a:p>
@@ -8097,7 +8097,7 @@
           <a:p>
             <a:fld id="{FD1C4689-B28D-4D3C-8B05-9ABB967E2A3E}" type="datetime1">
               <a:rPr lang="en-US" smtClean="0"/>
-              <a:t>2/9/2026</a:t>
+              <a:t>2/10/2026</a:t>
             </a:fld>
             <a:endParaRPr lang="en-US" dirty="0"/>
           </a:p>

</xml_diff>